<commit_message>
add trap-grass.png & trap-flower.png
</commit_message>
<xml_diff>
--- a/images/簡報1.pptx
+++ b/images/簡報1.pptx
@@ -18910,7 +18910,7 @@
             </p:nvSpPr>
             <p:spPr>
               <a:xfrm>
-                <a:off x="9576942" y="4125606"/>
+                <a:off x="9576942" y="4077341"/>
                 <a:ext cx="757237" cy="757237"/>
               </a:xfrm>
               <a:prstGeom prst="roundRect">
@@ -19065,7 +19065,7 @@
             </p:nvSpPr>
             <p:spPr>
               <a:xfrm>
-                <a:off x="9576942" y="5444498"/>
+                <a:off x="9576942" y="5397910"/>
                 <a:ext cx="757237" cy="757237"/>
               </a:xfrm>
               <a:prstGeom prst="roundRect">
@@ -20303,6 +20303,629 @@
           </a:p>
         </p:txBody>
       </p:sp>
+      <p:pic>
+        <p:nvPicPr>
+          <p:cNvPr id="2" name="圖片 1"/>
+          <p:cNvPicPr>
+            <a:picLocks noChangeAspect="1"/>
+          </p:cNvPicPr>
+          <p:nvPr/>
+        </p:nvPicPr>
+        <p:blipFill rotWithShape="1">
+          <a:blip r:embed="rId2">
+            <a:extLst>
+              <a:ext uri="{BEBA8EAE-BF5A-486C-A8C5-ECC9F3942E4B}">
+                <a14:imgProps xmlns:a14="http://schemas.microsoft.com/office/drawing/2010/main">
+                  <a14:imgLayer r:embed="rId3">
+                    <a14:imgEffect>
+                      <a14:backgroundRemoval t="3556" b="89778" l="4889" r="94667">
+                        <a14:foregroundMark x1="4889" y1="28444" x2="4889" y2="28444"/>
+                        <a14:foregroundMark x1="94667" y1="58667" x2="94667" y2="58667"/>
+                        <a14:foregroundMark x1="68889" y1="3556" x2="68889" y2="3556"/>
+                        <a14:foregroundMark x1="58667" y1="18222" x2="58667" y2="18222"/>
+                        <a14:foregroundMark x1="57778" y1="26222" x2="57778" y2="26222"/>
+                        <a14:foregroundMark x1="28444" y1="80000" x2="28444" y2="80000"/>
+                        <a14:foregroundMark x1="12000" y1="37333" x2="33333" y2="87111"/>
+                        <a14:foregroundMark x1="73333" y1="86222" x2="85778" y2="65333"/>
+                      </a14:backgroundRemoval>
+                    </a14:imgEffect>
+                  </a14:imgLayer>
+                </a14:imgProps>
+              </a:ext>
+              <a:ext uri="{28A0092B-C50C-407E-A947-70E740481C1C}">
+                <a14:useLocalDpi xmlns:a14="http://schemas.microsoft.com/office/drawing/2010/main" val="0"/>
+              </a:ext>
+            </a:extLst>
+          </a:blip>
+          <a:srcRect l="3248" r="4034" b="9651"/>
+          <a:stretch/>
+        </p:blipFill>
+        <p:spPr>
+          <a:xfrm>
+            <a:off x="5419932" y="1233488"/>
+            <a:ext cx="2649416" cy="1148862"/>
+          </a:xfrm>
+          <a:prstGeom prst="rect">
+            <a:avLst/>
+          </a:prstGeom>
+        </p:spPr>
+      </p:pic>
+      <p:sp>
+        <p:nvSpPr>
+          <p:cNvPr id="3" name="三角形 2"/>
+          <p:cNvSpPr/>
+          <p:nvPr/>
+        </p:nvSpPr>
+        <p:spPr>
+          <a:xfrm>
+            <a:off x="5528722" y="3681048"/>
+            <a:ext cx="217580" cy="187569"/>
+          </a:xfrm>
+          <a:prstGeom prst="triangle">
+            <a:avLst/>
+          </a:prstGeom>
+          <a:solidFill>
+            <a:srgbClr val="FF0000"/>
+          </a:solidFill>
+          <a:ln>
+            <a:solidFill>
+              <a:srgbClr val="FF0000"/>
+            </a:solidFill>
+          </a:ln>
+        </p:spPr>
+        <p:style>
+          <a:lnRef idx="2">
+            <a:schemeClr val="accent1">
+              <a:shade val="50000"/>
+            </a:schemeClr>
+          </a:lnRef>
+          <a:fillRef idx="1">
+            <a:schemeClr val="accent1"/>
+          </a:fillRef>
+          <a:effectRef idx="0">
+            <a:schemeClr val="accent1"/>
+          </a:effectRef>
+          <a:fontRef idx="minor">
+            <a:schemeClr val="lt1"/>
+          </a:fontRef>
+        </p:style>
+        <p:txBody>
+          <a:bodyPr rtlCol="0" anchor="ctr"/>
+          <a:lstStyle/>
+          <a:p>
+            <a:pPr algn="ctr"/>
+            <a:endParaRPr kumimoji="1" lang="zh-TW" altLang="en-US"/>
+          </a:p>
+        </p:txBody>
+      </p:sp>
+      <p:sp>
+        <p:nvSpPr>
+          <p:cNvPr id="7" name="三角形 6"/>
+          <p:cNvSpPr/>
+          <p:nvPr/>
+        </p:nvSpPr>
+        <p:spPr>
+          <a:xfrm>
+            <a:off x="5746302" y="3681048"/>
+            <a:ext cx="217580" cy="187569"/>
+          </a:xfrm>
+          <a:prstGeom prst="triangle">
+            <a:avLst/>
+          </a:prstGeom>
+          <a:solidFill>
+            <a:srgbClr val="FF0000"/>
+          </a:solidFill>
+          <a:ln>
+            <a:solidFill>
+              <a:srgbClr val="FF0000"/>
+            </a:solidFill>
+          </a:ln>
+        </p:spPr>
+        <p:style>
+          <a:lnRef idx="2">
+            <a:schemeClr val="accent1">
+              <a:shade val="50000"/>
+            </a:schemeClr>
+          </a:lnRef>
+          <a:fillRef idx="1">
+            <a:schemeClr val="accent1"/>
+          </a:fillRef>
+          <a:effectRef idx="0">
+            <a:schemeClr val="accent1"/>
+          </a:effectRef>
+          <a:fontRef idx="minor">
+            <a:schemeClr val="lt1"/>
+          </a:fontRef>
+        </p:style>
+        <p:txBody>
+          <a:bodyPr rtlCol="0" anchor="ctr"/>
+          <a:lstStyle/>
+          <a:p>
+            <a:pPr algn="ctr"/>
+            <a:endParaRPr kumimoji="1" lang="zh-TW" altLang="en-US"/>
+          </a:p>
+        </p:txBody>
+      </p:sp>
+      <p:sp>
+        <p:nvSpPr>
+          <p:cNvPr id="8" name="三角形 7"/>
+          <p:cNvSpPr/>
+          <p:nvPr/>
+        </p:nvSpPr>
+        <p:spPr>
+          <a:xfrm>
+            <a:off x="5963882" y="3681048"/>
+            <a:ext cx="217580" cy="187569"/>
+          </a:xfrm>
+          <a:prstGeom prst="triangle">
+            <a:avLst/>
+          </a:prstGeom>
+          <a:solidFill>
+            <a:srgbClr val="FF0000"/>
+          </a:solidFill>
+          <a:ln>
+            <a:solidFill>
+              <a:srgbClr val="FF0000"/>
+            </a:solidFill>
+          </a:ln>
+        </p:spPr>
+        <p:style>
+          <a:lnRef idx="2">
+            <a:schemeClr val="accent1">
+              <a:shade val="50000"/>
+            </a:schemeClr>
+          </a:lnRef>
+          <a:fillRef idx="1">
+            <a:schemeClr val="accent1"/>
+          </a:fillRef>
+          <a:effectRef idx="0">
+            <a:schemeClr val="accent1"/>
+          </a:effectRef>
+          <a:fontRef idx="minor">
+            <a:schemeClr val="lt1"/>
+          </a:fontRef>
+        </p:style>
+        <p:txBody>
+          <a:bodyPr rtlCol="0" anchor="ctr"/>
+          <a:lstStyle/>
+          <a:p>
+            <a:pPr algn="ctr"/>
+            <a:endParaRPr kumimoji="1" lang="zh-TW" altLang="en-US"/>
+          </a:p>
+        </p:txBody>
+      </p:sp>
+      <p:sp>
+        <p:nvSpPr>
+          <p:cNvPr id="9" name="三角形 8"/>
+          <p:cNvSpPr/>
+          <p:nvPr/>
+        </p:nvSpPr>
+        <p:spPr>
+          <a:xfrm>
+            <a:off x="6181462" y="3681048"/>
+            <a:ext cx="217580" cy="187569"/>
+          </a:xfrm>
+          <a:prstGeom prst="triangle">
+            <a:avLst/>
+          </a:prstGeom>
+          <a:solidFill>
+            <a:srgbClr val="FF0000"/>
+          </a:solidFill>
+          <a:ln>
+            <a:solidFill>
+              <a:srgbClr val="FF0000"/>
+            </a:solidFill>
+          </a:ln>
+        </p:spPr>
+        <p:style>
+          <a:lnRef idx="2">
+            <a:schemeClr val="accent1">
+              <a:shade val="50000"/>
+            </a:schemeClr>
+          </a:lnRef>
+          <a:fillRef idx="1">
+            <a:schemeClr val="accent1"/>
+          </a:fillRef>
+          <a:effectRef idx="0">
+            <a:schemeClr val="accent1"/>
+          </a:effectRef>
+          <a:fontRef idx="minor">
+            <a:schemeClr val="lt1"/>
+          </a:fontRef>
+        </p:style>
+        <p:txBody>
+          <a:bodyPr rtlCol="0" anchor="ctr"/>
+          <a:lstStyle/>
+          <a:p>
+            <a:pPr algn="ctr"/>
+            <a:endParaRPr kumimoji="1" lang="zh-TW" altLang="en-US"/>
+          </a:p>
+        </p:txBody>
+      </p:sp>
+      <p:sp>
+        <p:nvSpPr>
+          <p:cNvPr id="10" name="三角形 9"/>
+          <p:cNvSpPr/>
+          <p:nvPr/>
+        </p:nvSpPr>
+        <p:spPr>
+          <a:xfrm>
+            <a:off x="6399042" y="3681048"/>
+            <a:ext cx="217580" cy="187569"/>
+          </a:xfrm>
+          <a:prstGeom prst="triangle">
+            <a:avLst/>
+          </a:prstGeom>
+          <a:solidFill>
+            <a:srgbClr val="FF0000"/>
+          </a:solidFill>
+          <a:ln>
+            <a:solidFill>
+              <a:srgbClr val="FF0000"/>
+            </a:solidFill>
+          </a:ln>
+        </p:spPr>
+        <p:style>
+          <a:lnRef idx="2">
+            <a:schemeClr val="accent1">
+              <a:shade val="50000"/>
+            </a:schemeClr>
+          </a:lnRef>
+          <a:fillRef idx="1">
+            <a:schemeClr val="accent1"/>
+          </a:fillRef>
+          <a:effectRef idx="0">
+            <a:schemeClr val="accent1"/>
+          </a:effectRef>
+          <a:fontRef idx="minor">
+            <a:schemeClr val="lt1"/>
+          </a:fontRef>
+        </p:style>
+        <p:txBody>
+          <a:bodyPr rtlCol="0" anchor="ctr"/>
+          <a:lstStyle/>
+          <a:p>
+            <a:pPr algn="ctr"/>
+            <a:endParaRPr kumimoji="1" lang="zh-TW" altLang="en-US"/>
+          </a:p>
+        </p:txBody>
+      </p:sp>
+      <p:sp>
+        <p:nvSpPr>
+          <p:cNvPr id="11" name="三角形 10"/>
+          <p:cNvSpPr/>
+          <p:nvPr/>
+        </p:nvSpPr>
+        <p:spPr>
+          <a:xfrm>
+            <a:off x="6635850" y="3681047"/>
+            <a:ext cx="217580" cy="187569"/>
+          </a:xfrm>
+          <a:prstGeom prst="triangle">
+            <a:avLst/>
+          </a:prstGeom>
+          <a:solidFill>
+            <a:srgbClr val="FF0000"/>
+          </a:solidFill>
+          <a:ln>
+            <a:solidFill>
+              <a:srgbClr val="FF0000"/>
+            </a:solidFill>
+          </a:ln>
+        </p:spPr>
+        <p:style>
+          <a:lnRef idx="2">
+            <a:schemeClr val="accent1">
+              <a:shade val="50000"/>
+            </a:schemeClr>
+          </a:lnRef>
+          <a:fillRef idx="1">
+            <a:schemeClr val="accent1"/>
+          </a:fillRef>
+          <a:effectRef idx="0">
+            <a:schemeClr val="accent1"/>
+          </a:effectRef>
+          <a:fontRef idx="minor">
+            <a:schemeClr val="lt1"/>
+          </a:fontRef>
+        </p:style>
+        <p:txBody>
+          <a:bodyPr rtlCol="0" anchor="ctr"/>
+          <a:lstStyle/>
+          <a:p>
+            <a:pPr algn="ctr"/>
+            <a:endParaRPr kumimoji="1" lang="zh-TW" altLang="en-US"/>
+          </a:p>
+        </p:txBody>
+      </p:sp>
+      <p:sp>
+        <p:nvSpPr>
+          <p:cNvPr id="12" name="三角形 11"/>
+          <p:cNvSpPr/>
+          <p:nvPr/>
+        </p:nvSpPr>
+        <p:spPr>
+          <a:xfrm>
+            <a:off x="6853430" y="3681047"/>
+            <a:ext cx="217580" cy="187569"/>
+          </a:xfrm>
+          <a:prstGeom prst="triangle">
+            <a:avLst/>
+          </a:prstGeom>
+          <a:solidFill>
+            <a:srgbClr val="FF0000"/>
+          </a:solidFill>
+          <a:ln>
+            <a:solidFill>
+              <a:srgbClr val="FF0000"/>
+            </a:solidFill>
+          </a:ln>
+        </p:spPr>
+        <p:style>
+          <a:lnRef idx="2">
+            <a:schemeClr val="accent1">
+              <a:shade val="50000"/>
+            </a:schemeClr>
+          </a:lnRef>
+          <a:fillRef idx="1">
+            <a:schemeClr val="accent1"/>
+          </a:fillRef>
+          <a:effectRef idx="0">
+            <a:schemeClr val="accent1"/>
+          </a:effectRef>
+          <a:fontRef idx="minor">
+            <a:schemeClr val="lt1"/>
+          </a:fontRef>
+        </p:style>
+        <p:txBody>
+          <a:bodyPr rtlCol="0" anchor="ctr"/>
+          <a:lstStyle/>
+          <a:p>
+            <a:pPr algn="ctr"/>
+            <a:endParaRPr kumimoji="1" lang="zh-TW" altLang="en-US"/>
+          </a:p>
+        </p:txBody>
+      </p:sp>
+      <p:sp>
+        <p:nvSpPr>
+          <p:cNvPr id="13" name="三角形 12"/>
+          <p:cNvSpPr/>
+          <p:nvPr/>
+        </p:nvSpPr>
+        <p:spPr>
+          <a:xfrm>
+            <a:off x="7090238" y="3681047"/>
+            <a:ext cx="217580" cy="187569"/>
+          </a:xfrm>
+          <a:prstGeom prst="triangle">
+            <a:avLst/>
+          </a:prstGeom>
+          <a:solidFill>
+            <a:srgbClr val="FF0000"/>
+          </a:solidFill>
+          <a:ln>
+            <a:solidFill>
+              <a:srgbClr val="FF0000"/>
+            </a:solidFill>
+          </a:ln>
+        </p:spPr>
+        <p:style>
+          <a:lnRef idx="2">
+            <a:schemeClr val="accent1">
+              <a:shade val="50000"/>
+            </a:schemeClr>
+          </a:lnRef>
+          <a:fillRef idx="1">
+            <a:schemeClr val="accent1"/>
+          </a:fillRef>
+          <a:effectRef idx="0">
+            <a:schemeClr val="accent1"/>
+          </a:effectRef>
+          <a:fontRef idx="minor">
+            <a:schemeClr val="lt1"/>
+          </a:fontRef>
+        </p:style>
+        <p:txBody>
+          <a:bodyPr rtlCol="0" anchor="ctr"/>
+          <a:lstStyle/>
+          <a:p>
+            <a:pPr algn="ctr"/>
+            <a:endParaRPr kumimoji="1" lang="zh-TW" altLang="en-US"/>
+          </a:p>
+        </p:txBody>
+      </p:sp>
+      <p:sp>
+        <p:nvSpPr>
+          <p:cNvPr id="14" name="三角形 13"/>
+          <p:cNvSpPr/>
+          <p:nvPr/>
+        </p:nvSpPr>
+        <p:spPr>
+          <a:xfrm>
+            <a:off x="7327046" y="3681048"/>
+            <a:ext cx="217580" cy="187569"/>
+          </a:xfrm>
+          <a:prstGeom prst="triangle">
+            <a:avLst/>
+          </a:prstGeom>
+          <a:solidFill>
+            <a:srgbClr val="FF0000"/>
+          </a:solidFill>
+          <a:ln>
+            <a:solidFill>
+              <a:srgbClr val="FF0000"/>
+            </a:solidFill>
+          </a:ln>
+        </p:spPr>
+        <p:style>
+          <a:lnRef idx="2">
+            <a:schemeClr val="accent1">
+              <a:shade val="50000"/>
+            </a:schemeClr>
+          </a:lnRef>
+          <a:fillRef idx="1">
+            <a:schemeClr val="accent1"/>
+          </a:fillRef>
+          <a:effectRef idx="0">
+            <a:schemeClr val="accent1"/>
+          </a:effectRef>
+          <a:fontRef idx="minor">
+            <a:schemeClr val="lt1"/>
+          </a:fontRef>
+        </p:style>
+        <p:txBody>
+          <a:bodyPr rtlCol="0" anchor="ctr"/>
+          <a:lstStyle/>
+          <a:p>
+            <a:pPr algn="ctr"/>
+            <a:endParaRPr kumimoji="1" lang="zh-TW" altLang="en-US"/>
+          </a:p>
+        </p:txBody>
+      </p:sp>
+      <p:sp>
+        <p:nvSpPr>
+          <p:cNvPr id="15" name="三角形 14"/>
+          <p:cNvSpPr/>
+          <p:nvPr/>
+        </p:nvSpPr>
+        <p:spPr>
+          <a:xfrm>
+            <a:off x="7553766" y="3681047"/>
+            <a:ext cx="217580" cy="187569"/>
+          </a:xfrm>
+          <a:prstGeom prst="triangle">
+            <a:avLst/>
+          </a:prstGeom>
+          <a:solidFill>
+            <a:srgbClr val="FF0000"/>
+          </a:solidFill>
+          <a:ln>
+            <a:solidFill>
+              <a:srgbClr val="FF0000"/>
+            </a:solidFill>
+          </a:ln>
+        </p:spPr>
+        <p:style>
+          <a:lnRef idx="2">
+            <a:schemeClr val="accent1">
+              <a:shade val="50000"/>
+            </a:schemeClr>
+          </a:lnRef>
+          <a:fillRef idx="1">
+            <a:schemeClr val="accent1"/>
+          </a:fillRef>
+          <a:effectRef idx="0">
+            <a:schemeClr val="accent1"/>
+          </a:effectRef>
+          <a:fontRef idx="minor">
+            <a:schemeClr val="lt1"/>
+          </a:fontRef>
+        </p:style>
+        <p:txBody>
+          <a:bodyPr rtlCol="0" anchor="ctr"/>
+          <a:lstStyle/>
+          <a:p>
+            <a:pPr algn="ctr"/>
+            <a:endParaRPr kumimoji="1" lang="zh-TW" altLang="en-US"/>
+          </a:p>
+        </p:txBody>
+      </p:sp>
+      <p:sp>
+        <p:nvSpPr>
+          <p:cNvPr id="16" name="三角形 15"/>
+          <p:cNvSpPr/>
+          <p:nvPr/>
+        </p:nvSpPr>
+        <p:spPr>
+          <a:xfrm>
+            <a:off x="7765161" y="3681046"/>
+            <a:ext cx="217580" cy="187569"/>
+          </a:xfrm>
+          <a:prstGeom prst="triangle">
+            <a:avLst/>
+          </a:prstGeom>
+          <a:solidFill>
+            <a:srgbClr val="FF0000"/>
+          </a:solidFill>
+          <a:ln>
+            <a:solidFill>
+              <a:srgbClr val="FF0000"/>
+            </a:solidFill>
+          </a:ln>
+        </p:spPr>
+        <p:style>
+          <a:lnRef idx="2">
+            <a:schemeClr val="accent1">
+              <a:shade val="50000"/>
+            </a:schemeClr>
+          </a:lnRef>
+          <a:fillRef idx="1">
+            <a:schemeClr val="accent1"/>
+          </a:fillRef>
+          <a:effectRef idx="0">
+            <a:schemeClr val="accent1"/>
+          </a:effectRef>
+          <a:fontRef idx="minor">
+            <a:schemeClr val="lt1"/>
+          </a:fontRef>
+        </p:style>
+        <p:txBody>
+          <a:bodyPr rtlCol="0" anchor="ctr"/>
+          <a:lstStyle/>
+          <a:p>
+            <a:pPr algn="ctr"/>
+            <a:endParaRPr kumimoji="1" lang="zh-TW" altLang="en-US"/>
+          </a:p>
+        </p:txBody>
+      </p:sp>
+      <p:sp>
+        <p:nvSpPr>
+          <p:cNvPr id="17" name="三角形 16"/>
+          <p:cNvSpPr/>
+          <p:nvPr/>
+        </p:nvSpPr>
+        <p:spPr>
+          <a:xfrm>
+            <a:off x="7965128" y="3681045"/>
+            <a:ext cx="217580" cy="187569"/>
+          </a:xfrm>
+          <a:prstGeom prst="triangle">
+            <a:avLst/>
+          </a:prstGeom>
+          <a:solidFill>
+            <a:srgbClr val="FF0000"/>
+          </a:solidFill>
+          <a:ln>
+            <a:solidFill>
+              <a:srgbClr val="FF0000"/>
+            </a:solidFill>
+          </a:ln>
+        </p:spPr>
+        <p:style>
+          <a:lnRef idx="2">
+            <a:schemeClr val="accent1">
+              <a:shade val="50000"/>
+            </a:schemeClr>
+          </a:lnRef>
+          <a:fillRef idx="1">
+            <a:schemeClr val="accent1"/>
+          </a:fillRef>
+          <a:effectRef idx="0">
+            <a:schemeClr val="accent1"/>
+          </a:effectRef>
+          <a:fontRef idx="minor">
+            <a:schemeClr val="lt1"/>
+          </a:fontRef>
+        </p:style>
+        <p:txBody>
+          <a:bodyPr rtlCol="0" anchor="ctr"/>
+          <a:lstStyle/>
+          <a:p>
+            <a:pPr algn="ctr"/>
+            <a:endParaRPr kumimoji="1" lang="zh-TW" altLang="en-US"/>
+          </a:p>
+        </p:txBody>
+      </p:sp>
     </p:spTree>
     <p:extLst>
       <p:ext uri="{BB962C8B-B14F-4D97-AF65-F5344CB8AC3E}">
@@ -20313,6 +20936,13 @@
   <p:clrMapOvr>
     <a:masterClrMapping/>
   </p:clrMapOvr>
+  <p:timing>
+    <p:tnLst>
+      <p:par>
+        <p:cTn id="1" dur="indefinite" restart="never" nodeType="tmRoot"/>
+      </p:par>
+    </p:tnLst>
+  </p:timing>
 </p:sld>
 </file>
 

</xml_diff>

<commit_message>
add CheatScreen & position error
</commit_message>
<xml_diff>
--- a/images/簡報1.pptx
+++ b/images/簡報1.pptx
@@ -15529,7 +15529,7 @@
           <a:p>
             <a:fld id="{717A0F8B-93E4-D94C-A23F-3BFE25CA288E}" type="datetimeFigureOut">
               <a:rPr kumimoji="1" lang="zh-TW" altLang="en-US" smtClean="0"/>
-              <a:t>2018/6/10</a:t>
+              <a:t>2018/6/11</a:t>
             </a:fld>
             <a:endParaRPr kumimoji="1" lang="zh-TW" altLang="en-US"/>
           </a:p>
@@ -15928,7 +15928,7 @@
           <a:p>
             <a:fld id="{C5A3AF4C-25B1-F44B-852B-3193A0C807C6}" type="datetimeFigureOut">
               <a:rPr kumimoji="1" lang="zh-TW" altLang="en-US" smtClean="0"/>
-              <a:t>2018/6/10</a:t>
+              <a:t>2018/6/11</a:t>
             </a:fld>
             <a:endParaRPr kumimoji="1" lang="zh-TW" altLang="en-US"/>
           </a:p>
@@ -16093,7 +16093,7 @@
           <a:p>
             <a:fld id="{C5A3AF4C-25B1-F44B-852B-3193A0C807C6}" type="datetimeFigureOut">
               <a:rPr kumimoji="1" lang="zh-TW" altLang="en-US" smtClean="0"/>
-              <a:t>2018/6/10</a:t>
+              <a:t>2018/6/11</a:t>
             </a:fld>
             <a:endParaRPr kumimoji="1" lang="zh-TW" altLang="en-US"/>
           </a:p>
@@ -16268,7 +16268,7 @@
           <a:p>
             <a:fld id="{C5A3AF4C-25B1-F44B-852B-3193A0C807C6}" type="datetimeFigureOut">
               <a:rPr kumimoji="1" lang="zh-TW" altLang="en-US" smtClean="0"/>
-              <a:t>2018/6/10</a:t>
+              <a:t>2018/6/11</a:t>
             </a:fld>
             <a:endParaRPr kumimoji="1" lang="zh-TW" altLang="en-US"/>
           </a:p>
@@ -16433,7 +16433,7 @@
           <a:p>
             <a:fld id="{C5A3AF4C-25B1-F44B-852B-3193A0C807C6}" type="datetimeFigureOut">
               <a:rPr kumimoji="1" lang="zh-TW" altLang="en-US" smtClean="0"/>
-              <a:t>2018/6/10</a:t>
+              <a:t>2018/6/11</a:t>
             </a:fld>
             <a:endParaRPr kumimoji="1" lang="zh-TW" altLang="en-US"/>
           </a:p>
@@ -16672,7 +16672,7 @@
           <a:p>
             <a:fld id="{C5A3AF4C-25B1-F44B-852B-3193A0C807C6}" type="datetimeFigureOut">
               <a:rPr kumimoji="1" lang="zh-TW" altLang="en-US" smtClean="0"/>
-              <a:t>2018/6/10</a:t>
+              <a:t>2018/6/11</a:t>
             </a:fld>
             <a:endParaRPr kumimoji="1" lang="zh-TW" altLang="en-US"/>
           </a:p>
@@ -16899,7 +16899,7 @@
           <a:p>
             <a:fld id="{C5A3AF4C-25B1-F44B-852B-3193A0C807C6}" type="datetimeFigureOut">
               <a:rPr kumimoji="1" lang="zh-TW" altLang="en-US" smtClean="0"/>
-              <a:t>2018/6/10</a:t>
+              <a:t>2018/6/11</a:t>
             </a:fld>
             <a:endParaRPr kumimoji="1" lang="zh-TW" altLang="en-US"/>
           </a:p>
@@ -17261,7 +17261,7 @@
           <a:p>
             <a:fld id="{C5A3AF4C-25B1-F44B-852B-3193A0C807C6}" type="datetimeFigureOut">
               <a:rPr kumimoji="1" lang="zh-TW" altLang="en-US" smtClean="0"/>
-              <a:t>2018/6/10</a:t>
+              <a:t>2018/6/11</a:t>
             </a:fld>
             <a:endParaRPr kumimoji="1" lang="zh-TW" altLang="en-US"/>
           </a:p>
@@ -17374,7 +17374,7 @@
           <a:p>
             <a:fld id="{C5A3AF4C-25B1-F44B-852B-3193A0C807C6}" type="datetimeFigureOut">
               <a:rPr kumimoji="1" lang="zh-TW" altLang="en-US" smtClean="0"/>
-              <a:t>2018/6/10</a:t>
+              <a:t>2018/6/11</a:t>
             </a:fld>
             <a:endParaRPr kumimoji="1" lang="zh-TW" altLang="en-US"/>
           </a:p>
@@ -17464,7 +17464,7 @@
           <a:p>
             <a:fld id="{C5A3AF4C-25B1-F44B-852B-3193A0C807C6}" type="datetimeFigureOut">
               <a:rPr kumimoji="1" lang="zh-TW" altLang="en-US" smtClean="0"/>
-              <a:t>2018/6/10</a:t>
+              <a:t>2018/6/11</a:t>
             </a:fld>
             <a:endParaRPr kumimoji="1" lang="zh-TW" altLang="en-US"/>
           </a:p>
@@ -17736,7 +17736,7 @@
           <a:p>
             <a:fld id="{C5A3AF4C-25B1-F44B-852B-3193A0C807C6}" type="datetimeFigureOut">
               <a:rPr kumimoji="1" lang="zh-TW" altLang="en-US" smtClean="0"/>
-              <a:t>2018/6/10</a:t>
+              <a:t>2018/6/11</a:t>
             </a:fld>
             <a:endParaRPr kumimoji="1" lang="zh-TW" altLang="en-US"/>
           </a:p>
@@ -17988,7 +17988,7 @@
           <a:p>
             <a:fld id="{C5A3AF4C-25B1-F44B-852B-3193A0C807C6}" type="datetimeFigureOut">
               <a:rPr kumimoji="1" lang="zh-TW" altLang="en-US" smtClean="0"/>
-              <a:t>2018/6/10</a:t>
+              <a:t>2018/6/11</a:t>
             </a:fld>
             <a:endParaRPr kumimoji="1" lang="zh-TW" altLang="en-US"/>
           </a:p>
@@ -18196,7 +18196,7 @@
           <a:p>
             <a:fld id="{C5A3AF4C-25B1-F44B-852B-3193A0C807C6}" type="datetimeFigureOut">
               <a:rPr kumimoji="1" lang="zh-TW" altLang="en-US" smtClean="0"/>
-              <a:t>2018/6/10</a:t>
+              <a:t>2018/6/11</a:t>
             </a:fld>
             <a:endParaRPr kumimoji="1" lang="zh-TW" altLang="en-US"/>
           </a:p>
@@ -20167,6 +20167,66 @@
                 <a:cs typeface="Microsoft JhengHei" charset="-120"/>
               </a:rPr>
               <a:t>作弊</a:t>
+            </a:r>
+            <a:endParaRPr kumimoji="1" lang="zh-TW" altLang="en-US" sz="2925" b="1" dirty="0">
+              <a:solidFill>
+                <a:schemeClr val="tx1"/>
+              </a:solidFill>
+              <a:latin typeface="Microsoft JhengHei" charset="-120"/>
+              <a:ea typeface="Microsoft JhengHei" charset="-120"/>
+              <a:cs typeface="Microsoft JhengHei" charset="-120"/>
+            </a:endParaRPr>
+          </a:p>
+        </p:txBody>
+      </p:sp>
+      <p:sp>
+        <p:nvSpPr>
+          <p:cNvPr id="50" name="橢圓 49"/>
+          <p:cNvSpPr/>
+          <p:nvPr/>
+        </p:nvSpPr>
+        <p:spPr>
+          <a:xfrm>
+            <a:off x="3004250" y="4783459"/>
+            <a:ext cx="1483077" cy="954729"/>
+          </a:xfrm>
+          <a:prstGeom prst="ellipse">
+            <a:avLst/>
+          </a:prstGeom>
+          <a:noFill/>
+          <a:ln w="57150"/>
+        </p:spPr>
+        <p:style>
+          <a:lnRef idx="2">
+            <a:schemeClr val="accent1">
+              <a:shade val="50000"/>
+            </a:schemeClr>
+          </a:lnRef>
+          <a:fillRef idx="1">
+            <a:schemeClr val="accent1"/>
+          </a:fillRef>
+          <a:effectRef idx="0">
+            <a:schemeClr val="accent1"/>
+          </a:effectRef>
+          <a:fontRef idx="minor">
+            <a:schemeClr val="lt1"/>
+          </a:fontRef>
+        </p:style>
+        <p:txBody>
+          <a:bodyPr rtlCol="0" anchor="ctr"/>
+          <a:lstStyle/>
+          <a:p>
+            <a:pPr algn="ctr"/>
+            <a:r>
+              <a:rPr kumimoji="1" lang="zh-TW" altLang="en-US" sz="2925" b="1" dirty="0" smtClean="0">
+                <a:solidFill>
+                  <a:schemeClr val="tx1"/>
+                </a:solidFill>
+                <a:latin typeface="Microsoft JhengHei" charset="-120"/>
+                <a:ea typeface="Microsoft JhengHei" charset="-120"/>
+                <a:cs typeface="Microsoft JhengHei" charset="-120"/>
+              </a:rPr>
+              <a:t>開始</a:t>
             </a:r>
             <a:endParaRPr kumimoji="1" lang="zh-TW" altLang="en-US" sz="2925" b="1" dirty="0">
               <a:solidFill>
@@ -23031,7 +23091,7 @@
         </p:nvGrpSpPr>
         <p:grpSpPr>
           <a:xfrm>
-            <a:off x="0" y="117247"/>
+            <a:off x="0" y="187585"/>
             <a:ext cx="9906000" cy="5280437"/>
             <a:chOff x="0" y="339985"/>
             <a:chExt cx="9906000" cy="5280437"/>
@@ -24034,6 +24094,128 @@
           </p:sp>
         </p:grpSp>
       </p:grpSp>
+      <p:sp>
+        <p:nvSpPr>
+          <p:cNvPr id="30" name="矩形 29"/>
+          <p:cNvSpPr/>
+          <p:nvPr/>
+        </p:nvSpPr>
+        <p:spPr>
+          <a:xfrm>
+            <a:off x="2403231" y="5901761"/>
+            <a:ext cx="1008184" cy="299747"/>
+          </a:xfrm>
+          <a:prstGeom prst="rect">
+            <a:avLst/>
+          </a:prstGeom>
+          <a:solidFill>
+            <a:schemeClr val="accent1">
+              <a:lumMod val="20000"/>
+              <a:lumOff val="80000"/>
+            </a:schemeClr>
+          </a:solidFill>
+          <a:ln>
+            <a:noFill/>
+          </a:ln>
+        </p:spPr>
+        <p:style>
+          <a:lnRef idx="2">
+            <a:schemeClr val="accent1">
+              <a:shade val="50000"/>
+            </a:schemeClr>
+          </a:lnRef>
+          <a:fillRef idx="1">
+            <a:schemeClr val="accent1"/>
+          </a:fillRef>
+          <a:effectRef idx="0">
+            <a:schemeClr val="accent1"/>
+          </a:effectRef>
+          <a:fontRef idx="minor">
+            <a:schemeClr val="lt1"/>
+          </a:fontRef>
+        </p:style>
+        <p:txBody>
+          <a:bodyPr rtlCol="0" anchor="ctr"/>
+          <a:lstStyle/>
+          <a:p>
+            <a:pPr algn="ctr"/>
+            <a:r>
+              <a:rPr kumimoji="1" lang="zh-TW" altLang="en-US" dirty="0" smtClean="0">
+                <a:solidFill>
+                  <a:sysClr val="windowText" lastClr="000000"/>
+                </a:solidFill>
+              </a:rPr>
+              <a:t>未通過</a:t>
+            </a:r>
+            <a:endParaRPr kumimoji="1" lang="zh-TW" altLang="en-US" dirty="0">
+              <a:solidFill>
+                <a:sysClr val="windowText" lastClr="000000"/>
+              </a:solidFill>
+            </a:endParaRPr>
+          </a:p>
+        </p:txBody>
+      </p:sp>
+      <p:sp>
+        <p:nvSpPr>
+          <p:cNvPr id="31" name="矩形 30"/>
+          <p:cNvSpPr/>
+          <p:nvPr/>
+        </p:nvSpPr>
+        <p:spPr>
+          <a:xfrm>
+            <a:off x="3599641" y="5923737"/>
+            <a:ext cx="1008184" cy="299747"/>
+          </a:xfrm>
+          <a:prstGeom prst="rect">
+            <a:avLst/>
+          </a:prstGeom>
+          <a:solidFill>
+            <a:schemeClr val="accent1">
+              <a:lumMod val="20000"/>
+              <a:lumOff val="80000"/>
+            </a:schemeClr>
+          </a:solidFill>
+          <a:ln>
+            <a:noFill/>
+          </a:ln>
+        </p:spPr>
+        <p:style>
+          <a:lnRef idx="2">
+            <a:schemeClr val="accent1">
+              <a:shade val="50000"/>
+            </a:schemeClr>
+          </a:lnRef>
+          <a:fillRef idx="1">
+            <a:schemeClr val="accent1"/>
+          </a:fillRef>
+          <a:effectRef idx="0">
+            <a:schemeClr val="accent1"/>
+          </a:effectRef>
+          <a:fontRef idx="minor">
+            <a:schemeClr val="lt1"/>
+          </a:fontRef>
+        </p:style>
+        <p:txBody>
+          <a:bodyPr rtlCol="0" anchor="ctr"/>
+          <a:lstStyle/>
+          <a:p>
+            <a:pPr algn="ctr"/>
+            <a:r>
+              <a:rPr kumimoji="1" lang="zh-TW" altLang="en-US" smtClean="0">
+                <a:solidFill>
+                  <a:sysClr val="windowText" lastClr="000000"/>
+                </a:solidFill>
+              </a:rPr>
+              <a:t>通過</a:t>
+            </a:r>
+            <a:endParaRPr kumimoji="1" lang="zh-TW" altLang="en-US" dirty="0">
+              <a:solidFill>
+                <a:sysClr val="windowText" lastClr="000000"/>
+              </a:solidFill>
+            </a:endParaRPr>
+          </a:p>
+        </p:txBody>
+      </p:sp>
     </p:spTree>
     <p:extLst>
       <p:ext uri="{BB962C8B-B14F-4D97-AF65-F5344CB8AC3E}">

</xml_diff>